<commit_message>
improvements on languages content
</commit_message>
<xml_diff>
--- a/02-languages/01-teoria/02 Introducción a Typescript.pptx
+++ b/02-languages/01-teoria/02 Introducción a Typescript.pptx
@@ -2201,7 +2201,7 @@
           </a:ln>
           <a:extLst>
             <a:ext uri="{C572A759-6A51-4108-AA02-DFA0A04FC94B}">
-              <ma14:wrappingTextBoxFlag xmlns="" xmlns:m="http://schemas.openxmlformats.org/officeDocument/2006/math" xmlns:a14="http://schemas.microsoft.com/office/drawing/2010/main" xmlns:ma14="http://schemas.microsoft.com/office/mac/drawingml/2011/main" val="1"/>
+              <ma14:wrappingTextBoxFlag xmlns:ma14="http://schemas.microsoft.com/office/mac/drawingml/2011/main" xmlns:a14="http://schemas.microsoft.com/office/drawing/2010/main" xmlns:m="http://schemas.openxmlformats.org/officeDocument/2006/math" xmlns="" val="1"/>
             </a:ext>
           </a:extLst>
         </p:spPr>
@@ -2240,7 +2240,7 @@
           </a:ln>
           <a:extLst>
             <a:ext uri="{C572A759-6A51-4108-AA02-DFA0A04FC94B}">
-              <ma14:wrappingTextBoxFlag xmlns="" xmlns:m="http://schemas.openxmlformats.org/officeDocument/2006/math" xmlns:a14="http://schemas.microsoft.com/office/drawing/2010/main" xmlns:ma14="http://schemas.microsoft.com/office/mac/drawingml/2011/main" val="1"/>
+              <ma14:wrappingTextBoxFlag xmlns:ma14="http://schemas.microsoft.com/office/mac/drawingml/2011/main" xmlns:a14="http://schemas.microsoft.com/office/drawing/2010/main" xmlns:m="http://schemas.openxmlformats.org/officeDocument/2006/math" xmlns="" val="1"/>
             </a:ext>
           </a:extLst>
         </p:spPr>
@@ -3198,7 +3198,7 @@
           </a:ln>
           <a:extLst>
             <a:ext uri="{C572A759-6A51-4108-AA02-DFA0A04FC94B}">
-              <ma14:wrappingTextBoxFlag xmlns="" xmlns:m="http://schemas.openxmlformats.org/officeDocument/2006/math" xmlns:a14="http://schemas.microsoft.com/office/drawing/2010/main" xmlns:ma14="http://schemas.microsoft.com/office/mac/drawingml/2011/main" val="1"/>
+              <ma14:wrappingTextBoxFlag xmlns:ma14="http://schemas.microsoft.com/office/mac/drawingml/2011/main" xmlns:a14="http://schemas.microsoft.com/office/drawing/2010/main" xmlns:m="http://schemas.openxmlformats.org/officeDocument/2006/math" xmlns="" val="1"/>
             </a:ext>
           </a:extLst>
         </p:spPr>
@@ -3250,7 +3250,7 @@
           </a:ln>
           <a:extLst>
             <a:ext uri="{C572A759-6A51-4108-AA02-DFA0A04FC94B}">
-              <ma14:wrappingTextBoxFlag xmlns="" xmlns:m="http://schemas.openxmlformats.org/officeDocument/2006/math" xmlns:a14="http://schemas.microsoft.com/office/drawing/2010/main" xmlns:ma14="http://schemas.microsoft.com/office/mac/drawingml/2011/main" val="1"/>
+              <ma14:wrappingTextBoxFlag xmlns:ma14="http://schemas.microsoft.com/office/mac/drawingml/2011/main" xmlns:a14="http://schemas.microsoft.com/office/drawing/2010/main" xmlns:m="http://schemas.openxmlformats.org/officeDocument/2006/math" xmlns="" val="1"/>
             </a:ext>
           </a:extLst>
         </p:spPr>
@@ -3620,10 +3620,17 @@
           </a:lstStyle>
           <a:p>
             <a:r>
-              <a:rPr lang="en-GB"/>
-              <a:t>Qué es TypeScript?</a:t>
-            </a:r>
-            <a:endParaRPr lang="en-GB" dirty="0"/>
+              <a:rPr lang="en-GB" dirty="0"/>
+              <a:t>¿</a:t>
+            </a:r>
+            <a:r>
+              <a:rPr lang="en-GB" dirty="0" err="1"/>
+              <a:t>Qué</a:t>
+            </a:r>
+            <a:r>
+              <a:rPr lang="en-GB" dirty="0"/>
+              <a:t> es TypeScript?</a:t>
+            </a:r>
           </a:p>
         </p:txBody>
       </p:sp>
@@ -3688,7 +3695,7 @@
           </a:ln>
           <a:extLst>
             <a:ext uri="{C572A759-6A51-4108-AA02-DFA0A04FC94B}">
-              <ma14:wrappingTextBoxFlag xmlns:ma14="http://schemas.microsoft.com/office/mac/drawingml/2011/main" xmlns:a14="http://schemas.microsoft.com/office/drawing/2010/main" xmlns:m="http://schemas.openxmlformats.org/officeDocument/2006/math" xmlns="" val="1"/>
+              <ma14:wrappingTextBoxFlag xmlns="" xmlns:m="http://schemas.openxmlformats.org/officeDocument/2006/math" xmlns:a14="http://schemas.microsoft.com/office/drawing/2010/main" xmlns:ma14="http://schemas.microsoft.com/office/mac/drawingml/2011/main" val="1"/>
             </a:ext>
           </a:extLst>
         </p:spPr>
@@ -3769,7 +3776,7 @@
           </a:ln>
           <a:extLst>
             <a:ext uri="{C572A759-6A51-4108-AA02-DFA0A04FC94B}">
-              <ma14:wrappingTextBoxFlag xmlns:ma14="http://schemas.microsoft.com/office/mac/drawingml/2011/main" xmlns:a14="http://schemas.microsoft.com/office/drawing/2010/main" xmlns:m="http://schemas.openxmlformats.org/officeDocument/2006/math" xmlns="" val="1"/>
+              <ma14:wrappingTextBoxFlag xmlns="" xmlns:m="http://schemas.openxmlformats.org/officeDocument/2006/math" xmlns:a14="http://schemas.microsoft.com/office/drawing/2010/main" xmlns:ma14="http://schemas.microsoft.com/office/mac/drawingml/2011/main" val="1"/>
             </a:ext>
           </a:extLst>
         </p:spPr>
@@ -3837,7 +3844,7 @@
           </a:ln>
           <a:extLst>
             <a:ext uri="{C572A759-6A51-4108-AA02-DFA0A04FC94B}">
-              <ma14:wrappingTextBoxFlag xmlns:ma14="http://schemas.microsoft.com/office/mac/drawingml/2011/main" xmlns:a14="http://schemas.microsoft.com/office/drawing/2010/main" xmlns:m="http://schemas.openxmlformats.org/officeDocument/2006/math" xmlns="" val="1"/>
+              <ma14:wrappingTextBoxFlag xmlns="" xmlns:m="http://schemas.openxmlformats.org/officeDocument/2006/math" xmlns:a14="http://schemas.microsoft.com/office/drawing/2010/main" xmlns:ma14="http://schemas.microsoft.com/office/mac/drawingml/2011/main" val="1"/>
             </a:ext>
           </a:extLst>
         </p:spPr>
@@ -3962,7 +3969,7 @@
           </a:ln>
           <a:extLst>
             <a:ext uri="{C572A759-6A51-4108-AA02-DFA0A04FC94B}">
-              <ma14:wrappingTextBoxFlag xmlns:ma14="http://schemas.microsoft.com/office/mac/drawingml/2011/main" xmlns:a14="http://schemas.microsoft.com/office/drawing/2010/main" xmlns:m="http://schemas.openxmlformats.org/officeDocument/2006/math" xmlns="" val="1"/>
+              <ma14:wrappingTextBoxFlag xmlns="" xmlns:m="http://schemas.openxmlformats.org/officeDocument/2006/math" xmlns:a14="http://schemas.microsoft.com/office/drawing/2010/main" xmlns:ma14="http://schemas.microsoft.com/office/mac/drawingml/2011/main" val="1"/>
             </a:ext>
           </a:extLst>
         </p:spPr>
@@ -4023,7 +4030,7 @@
           </a:ln>
           <a:extLst>
             <a:ext uri="{C572A759-6A51-4108-AA02-DFA0A04FC94B}">
-              <ma14:wrappingTextBoxFlag xmlns:ma14="http://schemas.microsoft.com/office/mac/drawingml/2011/main" xmlns:a14="http://schemas.microsoft.com/office/drawing/2010/main" xmlns:m="http://schemas.openxmlformats.org/officeDocument/2006/math" xmlns="" val="1"/>
+              <ma14:wrappingTextBoxFlag xmlns="" xmlns:m="http://schemas.openxmlformats.org/officeDocument/2006/math" xmlns:a14="http://schemas.microsoft.com/office/drawing/2010/main" xmlns:ma14="http://schemas.microsoft.com/office/mac/drawingml/2011/main" val="1"/>
             </a:ext>
           </a:extLst>
         </p:spPr>
@@ -4125,7 +4132,7 @@
           </a:ln>
           <a:extLst>
             <a:ext uri="{C572A759-6A51-4108-AA02-DFA0A04FC94B}">
-              <ma14:wrappingTextBoxFlag xmlns:ma14="http://schemas.microsoft.com/office/mac/drawingml/2011/main" xmlns:a14="http://schemas.microsoft.com/office/drawing/2010/main" xmlns:m="http://schemas.openxmlformats.org/officeDocument/2006/math" xmlns="" val="1"/>
+              <ma14:wrappingTextBoxFlag xmlns="" xmlns:m="http://schemas.openxmlformats.org/officeDocument/2006/math" xmlns:a14="http://schemas.microsoft.com/office/drawing/2010/main" xmlns:ma14="http://schemas.microsoft.com/office/mac/drawingml/2011/main" val="1"/>
             </a:ext>
           </a:extLst>
         </p:spPr>
@@ -4717,7 +4724,7 @@
           </a:ln>
           <a:extLst>
             <a:ext uri="{C572A759-6A51-4108-AA02-DFA0A04FC94B}">
-              <ma14:wrappingTextBoxFlag xmlns="" xmlns:m="http://schemas.openxmlformats.org/officeDocument/2006/math" xmlns:a14="http://schemas.microsoft.com/office/drawing/2010/main" xmlns:ma14="http://schemas.microsoft.com/office/mac/drawingml/2011/main" val="1"/>
+              <ma14:wrappingTextBoxFlag xmlns:ma14="http://schemas.microsoft.com/office/mac/drawingml/2011/main" xmlns:a14="http://schemas.microsoft.com/office/drawing/2010/main" xmlns:m="http://schemas.openxmlformats.org/officeDocument/2006/math" xmlns="" val="1"/>
             </a:ext>
           </a:extLst>
         </p:spPr>
@@ -4775,7 +4782,7 @@
           <a:effectLst/>
           <a:extLst>
             <a:ext uri="{C572A759-6A51-4108-AA02-DFA0A04FC94B}">
-              <ma14:wrappingTextBoxFlag xmlns:ma14="http://schemas.microsoft.com/office/mac/drawingml/2011/main" xmlns:a14="http://schemas.microsoft.com/office/drawing/2010/main" xmlns:m="http://schemas.openxmlformats.org/officeDocument/2006/math" xmlns="" val="1"/>
+              <ma14:wrappingTextBoxFlag xmlns="" xmlns:m="http://schemas.openxmlformats.org/officeDocument/2006/math" xmlns:a14="http://schemas.microsoft.com/office/drawing/2010/main" xmlns:ma14="http://schemas.microsoft.com/office/mac/drawingml/2011/main" val="1"/>
             </a:ext>
           </a:extLst>
         </p:spPr>
@@ -4818,7 +4825,7 @@
         </p:nvSpPr>
         <p:spPr>
           <a:xfrm>
-            <a:off x="1040614" y="2068777"/>
+            <a:off x="1040614" y="2573037"/>
             <a:ext cx="2980942" cy="369330"/>
           </a:xfrm>
           <a:prstGeom prst="rect">
@@ -4834,7 +4841,7 @@
           <a:effectLst/>
           <a:extLst>
             <a:ext uri="{C572A759-6A51-4108-AA02-DFA0A04FC94B}">
-              <ma14:wrappingTextBoxFlag xmlns:ma14="http://schemas.microsoft.com/office/mac/drawingml/2011/main" xmlns:a14="http://schemas.microsoft.com/office/drawing/2010/main" xmlns:m="http://schemas.openxmlformats.org/officeDocument/2006/math" xmlns="" val="1"/>
+              <ma14:wrappingTextBoxFlag xmlns="" xmlns:m="http://schemas.openxmlformats.org/officeDocument/2006/math" xmlns:a14="http://schemas.microsoft.com/office/drawing/2010/main" xmlns:ma14="http://schemas.microsoft.com/office/mac/drawingml/2011/main" val="1"/>
             </a:ext>
           </a:extLst>
         </p:spPr>
@@ -4881,7 +4888,7 @@
         </p:nvSpPr>
         <p:spPr>
           <a:xfrm>
-            <a:off x="1040614" y="2571702"/>
+            <a:off x="1040614" y="3579873"/>
             <a:ext cx="5205911" cy="369330"/>
           </a:xfrm>
           <a:prstGeom prst="rect">
@@ -4897,7 +4904,7 @@
           <a:effectLst/>
           <a:extLst>
             <a:ext uri="{C572A759-6A51-4108-AA02-DFA0A04FC94B}">
-              <ma14:wrappingTextBoxFlag xmlns:ma14="http://schemas.microsoft.com/office/mac/drawingml/2011/main" xmlns:a14="http://schemas.microsoft.com/office/drawing/2010/main" xmlns:m="http://schemas.openxmlformats.org/officeDocument/2006/math" xmlns="" val="1"/>
+              <ma14:wrappingTextBoxFlag xmlns="" xmlns:m="http://schemas.openxmlformats.org/officeDocument/2006/math" xmlns:a14="http://schemas.microsoft.com/office/drawing/2010/main" xmlns:ma14="http://schemas.microsoft.com/office/mac/drawingml/2011/main" val="1"/>
             </a:ext>
           </a:extLst>
         </p:spPr>
@@ -4957,7 +4964,7 @@
         </p:nvSpPr>
         <p:spPr>
           <a:xfrm>
-            <a:off x="1040614" y="3080731"/>
+            <a:off x="1040614" y="2068283"/>
             <a:ext cx="2702020" cy="369330"/>
           </a:xfrm>
           <a:prstGeom prst="rect">
@@ -4973,7 +4980,7 @@
           <a:effectLst/>
           <a:extLst>
             <a:ext uri="{C572A759-6A51-4108-AA02-DFA0A04FC94B}">
-              <ma14:wrappingTextBoxFlag xmlns:ma14="http://schemas.microsoft.com/office/mac/drawingml/2011/main" xmlns:a14="http://schemas.microsoft.com/office/drawing/2010/main" xmlns:m="http://schemas.openxmlformats.org/officeDocument/2006/math" xmlns="" val="1"/>
+              <ma14:wrappingTextBoxFlag xmlns="" xmlns:m="http://schemas.openxmlformats.org/officeDocument/2006/math" xmlns:a14="http://schemas.microsoft.com/office/drawing/2010/main" xmlns:ma14="http://schemas.microsoft.com/office/mac/drawingml/2011/main" val="1"/>
             </a:ext>
           </a:extLst>
         </p:spPr>
@@ -5016,7 +5023,7 @@
         </p:nvSpPr>
         <p:spPr>
           <a:xfrm>
-            <a:off x="1040614" y="3589760"/>
+            <a:off x="1040614" y="3076455"/>
             <a:ext cx="5462391" cy="369330"/>
           </a:xfrm>
           <a:prstGeom prst="rect">
@@ -5032,7 +5039,7 @@
           <a:effectLst/>
           <a:extLst>
             <a:ext uri="{C572A759-6A51-4108-AA02-DFA0A04FC94B}">
-              <ma14:wrappingTextBoxFlag xmlns:ma14="http://schemas.microsoft.com/office/mac/drawingml/2011/main" xmlns:a14="http://schemas.microsoft.com/office/drawing/2010/main" xmlns:m="http://schemas.openxmlformats.org/officeDocument/2006/math" xmlns="" val="1"/>
+              <ma14:wrappingTextBoxFlag xmlns="" xmlns:m="http://schemas.openxmlformats.org/officeDocument/2006/math" xmlns:a14="http://schemas.microsoft.com/office/drawing/2010/main" xmlns:ma14="http://schemas.microsoft.com/office/mac/drawingml/2011/main" val="1"/>
             </a:ext>
           </a:extLst>
         </p:spPr>
@@ -5107,7 +5114,7 @@
           <a:effectLst/>
           <a:extLst>
             <a:ext uri="{C572A759-6A51-4108-AA02-DFA0A04FC94B}">
-              <ma14:wrappingTextBoxFlag xmlns:ma14="http://schemas.microsoft.com/office/mac/drawingml/2011/main" xmlns:a14="http://schemas.microsoft.com/office/drawing/2010/main" xmlns:m="http://schemas.openxmlformats.org/officeDocument/2006/math" xmlns="" val="1"/>
+              <ma14:wrappingTextBoxFlag xmlns="" xmlns:m="http://schemas.openxmlformats.org/officeDocument/2006/math" xmlns:a14="http://schemas.microsoft.com/office/drawing/2010/main" xmlns:ma14="http://schemas.microsoft.com/office/mac/drawingml/2011/main" val="1"/>
             </a:ext>
           </a:extLst>
         </p:spPr>
@@ -5388,7 +5395,7 @@
             <a:effectLst/>
             <a:extLst>
               <a:ext uri="{C572A759-6A51-4108-AA02-DFA0A04FC94B}">
-                <ma14:wrappingTextBoxFlag xmlns:ma14="http://schemas.microsoft.com/office/mac/drawingml/2011/main" xmlns:a14="http://schemas.microsoft.com/office/drawing/2010/main" xmlns:m="http://schemas.openxmlformats.org/officeDocument/2006/math" xmlns="" val="1"/>
+                <ma14:wrappingTextBoxFlag xmlns="" xmlns:m="http://schemas.openxmlformats.org/officeDocument/2006/math" xmlns:a14="http://schemas.microsoft.com/office/drawing/2010/main" xmlns:ma14="http://schemas.microsoft.com/office/mac/drawingml/2011/main" val="1"/>
               </a:ext>
             </a:extLst>
           </p:spPr>
@@ -5502,7 +5509,7 @@
             <a:effectLst/>
             <a:extLst>
               <a:ext uri="{C572A759-6A51-4108-AA02-DFA0A04FC94B}">
-                <ma14:wrappingTextBoxFlag xmlns:ma14="http://schemas.microsoft.com/office/mac/drawingml/2011/main" xmlns:a14="http://schemas.microsoft.com/office/drawing/2010/main" xmlns:m="http://schemas.openxmlformats.org/officeDocument/2006/math" xmlns="" val="1"/>
+                <ma14:wrappingTextBoxFlag xmlns="" xmlns:m="http://schemas.openxmlformats.org/officeDocument/2006/math" xmlns:a14="http://schemas.microsoft.com/office/drawing/2010/main" xmlns:ma14="http://schemas.microsoft.com/office/mac/drawingml/2011/main" val="1"/>
               </a:ext>
             </a:extLst>
           </p:spPr>
@@ -5605,7 +5612,7 @@
             <a:effectLst/>
             <a:extLst>
               <a:ext uri="{C572A759-6A51-4108-AA02-DFA0A04FC94B}">
-                <ma14:wrappingTextBoxFlag xmlns:ma14="http://schemas.microsoft.com/office/mac/drawingml/2011/main" xmlns:a14="http://schemas.microsoft.com/office/drawing/2010/main" xmlns:m="http://schemas.openxmlformats.org/officeDocument/2006/math" xmlns="" val="1"/>
+                <ma14:wrappingTextBoxFlag xmlns="" xmlns:m="http://schemas.openxmlformats.org/officeDocument/2006/math" xmlns:a14="http://schemas.microsoft.com/office/drawing/2010/main" xmlns:ma14="http://schemas.microsoft.com/office/mac/drawingml/2011/main" val="1"/>
               </a:ext>
             </a:extLst>
           </p:spPr>
@@ -5706,7 +5713,7 @@
             <a:effectLst/>
             <a:extLst>
               <a:ext uri="{C572A759-6A51-4108-AA02-DFA0A04FC94B}">
-                <ma14:wrappingTextBoxFlag xmlns:ma14="http://schemas.microsoft.com/office/mac/drawingml/2011/main" xmlns:a14="http://schemas.microsoft.com/office/drawing/2010/main" xmlns:m="http://schemas.openxmlformats.org/officeDocument/2006/math" xmlns="" val="1"/>
+                <ma14:wrappingTextBoxFlag xmlns="" xmlns:m="http://schemas.openxmlformats.org/officeDocument/2006/math" xmlns:a14="http://schemas.microsoft.com/office/drawing/2010/main" xmlns:ma14="http://schemas.microsoft.com/office/mac/drawingml/2011/main" val="1"/>
               </a:ext>
             </a:extLst>
           </p:spPr>
@@ -5769,7 +5776,7 @@
           <a:effectLst/>
           <a:extLst>
             <a:ext uri="{C572A759-6A51-4108-AA02-DFA0A04FC94B}">
-              <ma14:wrappingTextBoxFlag xmlns:ma14="http://schemas.microsoft.com/office/mac/drawingml/2011/main" xmlns:a14="http://schemas.microsoft.com/office/drawing/2010/main" xmlns:m="http://schemas.openxmlformats.org/officeDocument/2006/math" xmlns="" val="1"/>
+              <ma14:wrappingTextBoxFlag xmlns="" xmlns:m="http://schemas.openxmlformats.org/officeDocument/2006/math" xmlns:a14="http://schemas.microsoft.com/office/drawing/2010/main" xmlns:ma14="http://schemas.microsoft.com/office/mac/drawingml/2011/main" val="1"/>
             </a:ext>
           </a:extLst>
         </p:spPr>
@@ -5890,7 +5897,7 @@
             <a:effectLst/>
             <a:extLst>
               <a:ext uri="{C572A759-6A51-4108-AA02-DFA0A04FC94B}">
-                <ma14:wrappingTextBoxFlag xmlns:ma14="http://schemas.microsoft.com/office/mac/drawingml/2011/main" xmlns:a14="http://schemas.microsoft.com/office/drawing/2010/main" xmlns:m="http://schemas.openxmlformats.org/officeDocument/2006/math" xmlns="" val="1"/>
+                <ma14:wrappingTextBoxFlag xmlns="" xmlns:m="http://schemas.openxmlformats.org/officeDocument/2006/math" xmlns:a14="http://schemas.microsoft.com/office/drawing/2010/main" xmlns:ma14="http://schemas.microsoft.com/office/mac/drawingml/2011/main" val="1"/>
               </a:ext>
             </a:extLst>
           </p:spPr>
@@ -6002,7 +6009,7 @@
             <a:effectLst/>
             <a:extLst>
               <a:ext uri="{C572A759-6A51-4108-AA02-DFA0A04FC94B}">
-                <ma14:wrappingTextBoxFlag xmlns:ma14="http://schemas.microsoft.com/office/mac/drawingml/2011/main" xmlns:a14="http://schemas.microsoft.com/office/drawing/2010/main" xmlns:m="http://schemas.openxmlformats.org/officeDocument/2006/math" xmlns="" val="1"/>
+                <ma14:wrappingTextBoxFlag xmlns="" xmlns:m="http://schemas.openxmlformats.org/officeDocument/2006/math" xmlns:a14="http://schemas.microsoft.com/office/drawing/2010/main" xmlns:ma14="http://schemas.microsoft.com/office/mac/drawingml/2011/main" val="1"/>
               </a:ext>
             </a:extLst>
           </p:spPr>
@@ -6116,7 +6123,7 @@
             <a:effectLst/>
             <a:extLst>
               <a:ext uri="{C572A759-6A51-4108-AA02-DFA0A04FC94B}">
-                <ma14:wrappingTextBoxFlag xmlns:ma14="http://schemas.microsoft.com/office/mac/drawingml/2011/main" xmlns:a14="http://schemas.microsoft.com/office/drawing/2010/main" xmlns:m="http://schemas.openxmlformats.org/officeDocument/2006/math" xmlns="" val="1"/>
+                <ma14:wrappingTextBoxFlag xmlns="" xmlns:m="http://schemas.openxmlformats.org/officeDocument/2006/math" xmlns:a14="http://schemas.microsoft.com/office/drawing/2010/main" xmlns:ma14="http://schemas.microsoft.com/office/mac/drawingml/2011/main" val="1"/>
               </a:ext>
             </a:extLst>
           </p:spPr>
@@ -6219,7 +6226,7 @@
             <a:effectLst/>
             <a:extLst>
               <a:ext uri="{C572A759-6A51-4108-AA02-DFA0A04FC94B}">
-                <ma14:wrappingTextBoxFlag xmlns:ma14="http://schemas.microsoft.com/office/mac/drawingml/2011/main" xmlns:a14="http://schemas.microsoft.com/office/drawing/2010/main" xmlns:m="http://schemas.openxmlformats.org/officeDocument/2006/math" xmlns="" val="1"/>
+                <ma14:wrappingTextBoxFlag xmlns="" xmlns:m="http://schemas.openxmlformats.org/officeDocument/2006/math" xmlns:a14="http://schemas.microsoft.com/office/drawing/2010/main" xmlns:ma14="http://schemas.microsoft.com/office/mac/drawingml/2011/main" val="1"/>
               </a:ext>
             </a:extLst>
           </p:spPr>
@@ -6340,7 +6347,7 @@
               <a:effectLst/>
               <a:extLst>
                 <a:ext uri="{C572A759-6A51-4108-AA02-DFA0A04FC94B}">
-                  <ma14:wrappingTextBoxFlag xmlns:ma14="http://schemas.microsoft.com/office/mac/drawingml/2011/main" xmlns:a14="http://schemas.microsoft.com/office/drawing/2010/main" xmlns:m="http://schemas.openxmlformats.org/officeDocument/2006/math" xmlns="" val="1"/>
+                  <ma14:wrappingTextBoxFlag xmlns="" xmlns:m="http://schemas.openxmlformats.org/officeDocument/2006/math" xmlns:a14="http://schemas.microsoft.com/office/drawing/2010/main" xmlns:ma14="http://schemas.microsoft.com/office/mac/drawingml/2011/main" val="1"/>
                 </a:ext>
               </a:extLst>
             </p:spPr>
@@ -6403,7 +6410,7 @@
               <a:effectLst/>
               <a:extLst>
                 <a:ext uri="{C572A759-6A51-4108-AA02-DFA0A04FC94B}">
-                  <ma14:wrappingTextBoxFlag xmlns:ma14="http://schemas.microsoft.com/office/mac/drawingml/2011/main" xmlns:a14="http://schemas.microsoft.com/office/drawing/2010/main" xmlns:m="http://schemas.openxmlformats.org/officeDocument/2006/math" xmlns="" val="1"/>
+                  <ma14:wrappingTextBoxFlag xmlns="" xmlns:m="http://schemas.openxmlformats.org/officeDocument/2006/math" xmlns:a14="http://schemas.microsoft.com/office/drawing/2010/main" xmlns:ma14="http://schemas.microsoft.com/office/mac/drawingml/2011/main" val="1"/>
                 </a:ext>
               </a:extLst>
             </p:spPr>
@@ -6552,7 +6559,7 @@
             <a:effectLst/>
             <a:extLst>
               <a:ext uri="{C572A759-6A51-4108-AA02-DFA0A04FC94B}">
-                <ma14:wrappingTextBoxFlag xmlns:ma14="http://schemas.microsoft.com/office/mac/drawingml/2011/main" xmlns:a14="http://schemas.microsoft.com/office/drawing/2010/main" xmlns:m="http://schemas.openxmlformats.org/officeDocument/2006/math" xmlns="" val="1"/>
+                <ma14:wrappingTextBoxFlag xmlns="" xmlns:m="http://schemas.openxmlformats.org/officeDocument/2006/math" xmlns:a14="http://schemas.microsoft.com/office/drawing/2010/main" xmlns:ma14="http://schemas.microsoft.com/office/mac/drawingml/2011/main" val="1"/>
               </a:ext>
             </a:extLst>
           </p:spPr>
@@ -6687,7 +6694,7 @@
             <a:effectLst/>
             <a:extLst>
               <a:ext uri="{C572A759-6A51-4108-AA02-DFA0A04FC94B}">
-                <ma14:wrappingTextBoxFlag xmlns:ma14="http://schemas.microsoft.com/office/mac/drawingml/2011/main" xmlns:a14="http://schemas.microsoft.com/office/drawing/2010/main" xmlns:m="http://schemas.openxmlformats.org/officeDocument/2006/math" xmlns="" val="1"/>
+                <ma14:wrappingTextBoxFlag xmlns="" xmlns:m="http://schemas.openxmlformats.org/officeDocument/2006/math" xmlns:a14="http://schemas.microsoft.com/office/drawing/2010/main" xmlns:ma14="http://schemas.microsoft.com/office/mac/drawingml/2011/main" val="1"/>
               </a:ext>
             </a:extLst>
           </p:spPr>
@@ -6801,7 +6808,7 @@
             <a:effectLst/>
             <a:extLst>
               <a:ext uri="{C572A759-6A51-4108-AA02-DFA0A04FC94B}">
-                <ma14:wrappingTextBoxFlag xmlns:ma14="http://schemas.microsoft.com/office/mac/drawingml/2011/main" xmlns:a14="http://schemas.microsoft.com/office/drawing/2010/main" xmlns:m="http://schemas.openxmlformats.org/officeDocument/2006/math" xmlns="" val="1"/>
+                <ma14:wrappingTextBoxFlag xmlns="" xmlns:m="http://schemas.openxmlformats.org/officeDocument/2006/math" xmlns:a14="http://schemas.microsoft.com/office/drawing/2010/main" xmlns:ma14="http://schemas.microsoft.com/office/mac/drawingml/2011/main" val="1"/>
               </a:ext>
             </a:extLst>
           </p:spPr>
@@ -6904,7 +6911,7 @@
             <a:effectLst/>
             <a:extLst>
               <a:ext uri="{C572A759-6A51-4108-AA02-DFA0A04FC94B}">
-                <ma14:wrappingTextBoxFlag xmlns:ma14="http://schemas.microsoft.com/office/mac/drawingml/2011/main" xmlns:a14="http://schemas.microsoft.com/office/drawing/2010/main" xmlns:m="http://schemas.openxmlformats.org/officeDocument/2006/math" xmlns="" val="1"/>
+                <ma14:wrappingTextBoxFlag xmlns="" xmlns:m="http://schemas.openxmlformats.org/officeDocument/2006/math" xmlns:a14="http://schemas.microsoft.com/office/drawing/2010/main" xmlns:ma14="http://schemas.microsoft.com/office/mac/drawingml/2011/main" val="1"/>
               </a:ext>
             </a:extLst>
           </p:spPr>
@@ -7005,7 +7012,7 @@
             <a:effectLst/>
             <a:extLst>
               <a:ext uri="{C572A759-6A51-4108-AA02-DFA0A04FC94B}">
-                <ma14:wrappingTextBoxFlag xmlns:ma14="http://schemas.microsoft.com/office/mac/drawingml/2011/main" xmlns:a14="http://schemas.microsoft.com/office/drawing/2010/main" xmlns:m="http://schemas.openxmlformats.org/officeDocument/2006/math" xmlns="" val="1"/>
+                <ma14:wrappingTextBoxFlag xmlns="" xmlns:m="http://schemas.openxmlformats.org/officeDocument/2006/math" xmlns:a14="http://schemas.microsoft.com/office/drawing/2010/main" xmlns:ma14="http://schemas.microsoft.com/office/mac/drawingml/2011/main" val="1"/>
               </a:ext>
             </a:extLst>
           </p:spPr>
@@ -7114,7 +7121,7 @@
             <a:effectLst/>
             <a:extLst>
               <a:ext uri="{C572A759-6A51-4108-AA02-DFA0A04FC94B}">
-                <ma14:wrappingTextBoxFlag xmlns:ma14="http://schemas.microsoft.com/office/mac/drawingml/2011/main" xmlns:a14="http://schemas.microsoft.com/office/drawing/2010/main" xmlns:m="http://schemas.openxmlformats.org/officeDocument/2006/math" xmlns="" val="1"/>
+                <ma14:wrappingTextBoxFlag xmlns="" xmlns:m="http://schemas.openxmlformats.org/officeDocument/2006/math" xmlns:a14="http://schemas.microsoft.com/office/drawing/2010/main" xmlns:ma14="http://schemas.microsoft.com/office/mac/drawingml/2011/main" val="1"/>
               </a:ext>
             </a:extLst>
           </p:spPr>
@@ -7318,7 +7325,7 @@
               <a:effectLst/>
               <a:extLst>
                 <a:ext uri="{C572A759-6A51-4108-AA02-DFA0A04FC94B}">
-                  <ma14:wrappingTextBoxFlag xmlns:ma14="http://schemas.microsoft.com/office/mac/drawingml/2011/main" xmlns:a14="http://schemas.microsoft.com/office/drawing/2010/main" xmlns:m="http://schemas.openxmlformats.org/officeDocument/2006/math" xmlns="" val="1"/>
+                  <ma14:wrappingTextBoxFlag xmlns="" xmlns:m="http://schemas.openxmlformats.org/officeDocument/2006/math" xmlns:a14="http://schemas.microsoft.com/office/drawing/2010/main" xmlns:ma14="http://schemas.microsoft.com/office/mac/drawingml/2011/main" val="1"/>
                 </a:ext>
               </a:extLst>
             </p:spPr>
@@ -7430,7 +7437,7 @@
               <a:effectLst/>
               <a:extLst>
                 <a:ext uri="{C572A759-6A51-4108-AA02-DFA0A04FC94B}">
-                  <ma14:wrappingTextBoxFlag xmlns:ma14="http://schemas.microsoft.com/office/mac/drawingml/2011/main" xmlns:a14="http://schemas.microsoft.com/office/drawing/2010/main" xmlns:m="http://schemas.openxmlformats.org/officeDocument/2006/math" xmlns="" val="1"/>
+                  <ma14:wrappingTextBoxFlag xmlns="" xmlns:m="http://schemas.openxmlformats.org/officeDocument/2006/math" xmlns:a14="http://schemas.microsoft.com/office/drawing/2010/main" xmlns:ma14="http://schemas.microsoft.com/office/mac/drawingml/2011/main" val="1"/>
                 </a:ext>
               </a:extLst>
             </p:spPr>
@@ -7544,7 +7551,7 @@
               <a:effectLst/>
               <a:extLst>
                 <a:ext uri="{C572A759-6A51-4108-AA02-DFA0A04FC94B}">
-                  <ma14:wrappingTextBoxFlag xmlns:ma14="http://schemas.microsoft.com/office/mac/drawingml/2011/main" xmlns:a14="http://schemas.microsoft.com/office/drawing/2010/main" xmlns:m="http://schemas.openxmlformats.org/officeDocument/2006/math" xmlns="" val="1"/>
+                  <ma14:wrappingTextBoxFlag xmlns="" xmlns:m="http://schemas.openxmlformats.org/officeDocument/2006/math" xmlns:a14="http://schemas.microsoft.com/office/drawing/2010/main" xmlns:ma14="http://schemas.microsoft.com/office/mac/drawingml/2011/main" val="1"/>
                 </a:ext>
               </a:extLst>
             </p:spPr>
@@ -7706,7 +7713,7 @@
                 <a:effectLst/>
                 <a:extLst>
                   <a:ext uri="{C572A759-6A51-4108-AA02-DFA0A04FC94B}">
-                    <ma14:wrappingTextBoxFlag xmlns:ma14="http://schemas.microsoft.com/office/mac/drawingml/2011/main" xmlns:a14="http://schemas.microsoft.com/office/drawing/2010/main" xmlns:m="http://schemas.openxmlformats.org/officeDocument/2006/math" xmlns="" val="1"/>
+                    <ma14:wrappingTextBoxFlag xmlns="" xmlns:m="http://schemas.openxmlformats.org/officeDocument/2006/math" xmlns:a14="http://schemas.microsoft.com/office/drawing/2010/main" xmlns:ma14="http://schemas.microsoft.com/office/mac/drawingml/2011/main" val="1"/>
                   </a:ext>
                 </a:extLst>
               </p:spPr>
@@ -7769,7 +7776,7 @@
                 <a:effectLst/>
                 <a:extLst>
                   <a:ext uri="{C572A759-6A51-4108-AA02-DFA0A04FC94B}">
-                    <ma14:wrappingTextBoxFlag xmlns:ma14="http://schemas.microsoft.com/office/mac/drawingml/2011/main" xmlns:a14="http://schemas.microsoft.com/office/drawing/2010/main" xmlns:m="http://schemas.openxmlformats.org/officeDocument/2006/math" xmlns="" val="1"/>
+                    <ma14:wrappingTextBoxFlag xmlns="" xmlns:m="http://schemas.openxmlformats.org/officeDocument/2006/math" xmlns:a14="http://schemas.microsoft.com/office/drawing/2010/main" xmlns:ma14="http://schemas.microsoft.com/office/mac/drawingml/2011/main" val="1"/>
                   </a:ext>
                 </a:extLst>
               </p:spPr>
@@ -7833,7 +7840,7 @@
             <a:effectLst/>
             <a:extLst>
               <a:ext uri="{C572A759-6A51-4108-AA02-DFA0A04FC94B}">
-                <ma14:wrappingTextBoxFlag xmlns:ma14="http://schemas.microsoft.com/office/mac/drawingml/2011/main" xmlns:a14="http://schemas.microsoft.com/office/drawing/2010/main" xmlns:m="http://schemas.openxmlformats.org/officeDocument/2006/math" xmlns="" val="1"/>
+                <ma14:wrappingTextBoxFlag xmlns="" xmlns:m="http://schemas.openxmlformats.org/officeDocument/2006/math" xmlns:a14="http://schemas.microsoft.com/office/drawing/2010/main" xmlns:ma14="http://schemas.microsoft.com/office/mac/drawingml/2011/main" val="1"/>
               </a:ext>
             </a:extLst>
           </p:spPr>
@@ -7981,7 +7988,7 @@
           </a:ln>
           <a:extLst>
             <a:ext uri="{C572A759-6A51-4108-AA02-DFA0A04FC94B}">
-              <ma14:wrappingTextBoxFlag xmlns:ma14="http://schemas.microsoft.com/office/mac/drawingml/2011/main" xmlns:a14="http://schemas.microsoft.com/office/drawing/2010/main" xmlns:m="http://schemas.openxmlformats.org/officeDocument/2006/math" xmlns="" val="1"/>
+              <ma14:wrappingTextBoxFlag xmlns="" xmlns:m="http://schemas.openxmlformats.org/officeDocument/2006/math" xmlns:a14="http://schemas.microsoft.com/office/drawing/2010/main" xmlns:ma14="http://schemas.microsoft.com/office/mac/drawingml/2011/main" val="1"/>
             </a:ext>
           </a:extLst>
         </p:spPr>
@@ -8259,7 +8266,7 @@
             <a:effectLst/>
             <a:extLst>
               <a:ext uri="{C572A759-6A51-4108-AA02-DFA0A04FC94B}">
-                <ma14:wrappingTextBoxFlag xmlns="" xmlns:m="http://schemas.openxmlformats.org/officeDocument/2006/math" xmlns:a14="http://schemas.microsoft.com/office/drawing/2010/main" xmlns:ma14="http://schemas.microsoft.com/office/mac/drawingml/2011/main" val="1"/>
+                <ma14:wrappingTextBoxFlag xmlns:ma14="http://schemas.microsoft.com/office/mac/drawingml/2011/main" xmlns:a14="http://schemas.microsoft.com/office/drawing/2010/main" xmlns:m="http://schemas.openxmlformats.org/officeDocument/2006/math" xmlns="" val="1"/>
               </a:ext>
             </a:extLst>
           </p:spPr>
@@ -8309,7 +8316,7 @@
             <a:effectLst/>
             <a:extLst>
               <a:ext uri="{C572A759-6A51-4108-AA02-DFA0A04FC94B}">
-                <ma14:wrappingTextBoxFlag xmlns="" xmlns:m="http://schemas.openxmlformats.org/officeDocument/2006/math" xmlns:a14="http://schemas.microsoft.com/office/drawing/2010/main" xmlns:ma14="http://schemas.microsoft.com/office/mac/drawingml/2011/main" val="1"/>
+                <ma14:wrappingTextBoxFlag xmlns:ma14="http://schemas.microsoft.com/office/mac/drawingml/2011/main" xmlns:a14="http://schemas.microsoft.com/office/drawing/2010/main" xmlns:m="http://schemas.openxmlformats.org/officeDocument/2006/math" xmlns="" val="1"/>
               </a:ext>
             </a:extLst>
           </p:spPr>
@@ -8359,7 +8366,7 @@
             <a:effectLst/>
             <a:extLst>
               <a:ext uri="{C572A759-6A51-4108-AA02-DFA0A04FC94B}">
-                <ma14:wrappingTextBoxFlag xmlns="" xmlns:m="http://schemas.openxmlformats.org/officeDocument/2006/math" xmlns:a14="http://schemas.microsoft.com/office/drawing/2010/main" xmlns:ma14="http://schemas.microsoft.com/office/mac/drawingml/2011/main" val="1"/>
+                <ma14:wrappingTextBoxFlag xmlns:ma14="http://schemas.microsoft.com/office/mac/drawingml/2011/main" xmlns:a14="http://schemas.microsoft.com/office/drawing/2010/main" xmlns:m="http://schemas.openxmlformats.org/officeDocument/2006/math" xmlns="" val="1"/>
               </a:ext>
             </a:extLst>
           </p:spPr>
@@ -8409,7 +8416,7 @@
             <a:effectLst/>
             <a:extLst>
               <a:ext uri="{C572A759-6A51-4108-AA02-DFA0A04FC94B}">
-                <ma14:wrappingTextBoxFlag xmlns="" xmlns:m="http://schemas.openxmlformats.org/officeDocument/2006/math" xmlns:a14="http://schemas.microsoft.com/office/drawing/2010/main" xmlns:ma14="http://schemas.microsoft.com/office/mac/drawingml/2011/main" val="1"/>
+                <ma14:wrappingTextBoxFlag xmlns:ma14="http://schemas.microsoft.com/office/mac/drawingml/2011/main" xmlns:a14="http://schemas.microsoft.com/office/drawing/2010/main" xmlns:m="http://schemas.openxmlformats.org/officeDocument/2006/math" xmlns="" val="1"/>
               </a:ext>
             </a:extLst>
           </p:spPr>

</xml_diff>